<commit_message>
removing prop gyro code
</commit_message>
<xml_diff>
--- a/translations/en-us/advanced/GyroTurn.pptx
+++ b/translations/en-us/advanced/GyroTurn.pptx
@@ -5,10 +5,10 @@
     <p:sldMasterId id="2147483835" r:id="rId1"/>
   </p:sldMasterIdLst>
   <p:notesMasterIdLst>
-    <p:notesMasterId r:id="rId21"/>
+    <p:notesMasterId r:id="rId17"/>
   </p:notesMasterIdLst>
   <p:handoutMasterIdLst>
-    <p:handoutMasterId r:id="rId22"/>
+    <p:handoutMasterId r:id="rId18"/>
   </p:handoutMasterIdLst>
   <p:sldIdLst>
     <p:sldId id="258" r:id="rId2"/>
@@ -24,12 +24,8 @@
     <p:sldId id="283" r:id="rId12"/>
     <p:sldId id="284" r:id="rId13"/>
     <p:sldId id="285" r:id="rId14"/>
-    <p:sldId id="277" r:id="rId15"/>
-    <p:sldId id="294" r:id="rId16"/>
-    <p:sldId id="288" r:id="rId17"/>
-    <p:sldId id="287" r:id="rId18"/>
-    <p:sldId id="290" r:id="rId19"/>
-    <p:sldId id="274" r:id="rId20"/>
+    <p:sldId id="290" r:id="rId15"/>
+    <p:sldId id="274" r:id="rId16"/>
   </p:sldIdLst>
   <p:sldSz cx="9144000" cy="6858000" type="screen4x3"/>
   <p:notesSz cx="6858000" cy="9144000"/>
@@ -229,7 +225,7 @@
           <a:p>
             <a:fld id="{E354B44E-40A3-0E46-B16A-9BF1250A248B}" type="datetimeFigureOut">
               <a:rPr lang="en-US" smtClean="0"/>
-              <a:t>11/15/15</a:t>
+              <a:t>12/19/15</a:t>
             </a:fld>
             <a:endParaRPr lang="en-US"/>
           </a:p>
@@ -395,7 +391,7 @@
           <a:p>
             <a:fld id="{C86AD16C-2DB4-6642-BAD4-9ED973A087A0}" type="datetimeFigureOut">
               <a:rPr lang="en-US" smtClean="0"/>
-              <a:t>11/15/15</a:t>
+              <a:t>12/19/15</a:t>
             </a:fld>
             <a:endParaRPr lang="en-US"/>
           </a:p>
@@ -813,7 +809,7 @@
           <a:p>
             <a:fld id="{1E5BF589-3978-3C45-966B-D7B7A71F2A02}" type="slidenum">
               <a:rPr lang="en-US" smtClean="0"/>
-              <a:t>18</a:t>
+              <a:t>14</a:t>
             </a:fld>
             <a:endParaRPr lang="en-US" dirty="0"/>
           </a:p>
@@ -897,7 +893,7 @@
           <a:p>
             <a:fld id="{1E5BF589-3978-3C45-966B-D7B7A71F2A02}" type="slidenum">
               <a:rPr lang="en-US" smtClean="0"/>
-              <a:t>19</a:t>
+              <a:t>15</a:t>
             </a:fld>
             <a:endParaRPr lang="en-US"/>
           </a:p>
@@ -948,9 +944,9 @@
           <a:bodyPr/>
           <a:lstStyle/>
           <a:p>
-            <a:fld id="{03D03224-C78A-48B8-ACAD-0B29C3D7860E}" type="datetime1">
-              <a:rPr lang="en-US" smtClean="0"/>
-              <a:t>11/15/15</a:t>
+            <a:fld id="{8AD7084A-C26D-684D-A138-DFE5213BA0DC}" type="datetime1">
+              <a:rPr lang="en-US" smtClean="0"/>
+              <a:t>12/19/15</a:t>
             </a:fld>
             <a:endParaRPr lang="en-US"/>
           </a:p>
@@ -972,8 +968,8 @@
           <a:lstStyle/>
           <a:p>
             <a:r>
-              <a:rPr lang="en-US" smtClean="0"/>
-              <a:t>© 2015 EV3Lessons.com, Last edit 11/10/2015</a:t>
+              <a:rPr lang="sk-SK" smtClean="0"/>
+              <a:t>© 2015 EV3Lessons.com, Last edit 12/19/2015</a:t>
             </a:r>
             <a:endParaRPr lang="en-US"/>
           </a:p>
@@ -1501,7 +1497,7 @@
           <a:noFill/>
           <a:extLst>
             <a:ext uri="{909E8E84-426E-40dd-AFC4-6F175D3DCCD1}">
-              <a14:hiddenFill xmlns="" xmlns:a14="http://schemas.microsoft.com/office/drawing/2010/main">
+              <a14:hiddenFill xmlns:a14="http://schemas.microsoft.com/office/drawing/2010/main" xmlns="">
                 <a:solidFill>
                   <a:srgbClr val="FFFFFF"/>
                 </a:solidFill>
@@ -1879,9 +1875,9 @@
           <a:bodyPr/>
           <a:lstStyle/>
           <a:p>
-            <a:fld id="{23D6D190-0146-476A-ABDB-25C129936575}" type="datetime1">
-              <a:rPr lang="en-US" smtClean="0"/>
-              <a:t>11/15/15</a:t>
+            <a:fld id="{AB9FB5B2-73AB-6340-B2F0-B280A041D803}" type="datetime1">
+              <a:rPr lang="en-US" smtClean="0"/>
+              <a:t>12/19/15</a:t>
             </a:fld>
             <a:endParaRPr lang="en-US"/>
           </a:p>
@@ -1903,8 +1899,8 @@
           <a:lstStyle/>
           <a:p>
             <a:r>
-              <a:rPr lang="en-US" smtClean="0"/>
-              <a:t>© 2015 EV3Lessons.com, Last edit 11/10/2015</a:t>
+              <a:rPr lang="sk-SK" smtClean="0"/>
+              <a:t>© 2015 EV3Lessons.com, Last edit 12/19/2015</a:t>
             </a:r>
             <a:endParaRPr lang="en-US"/>
           </a:p>
@@ -2237,9 +2233,9 @@
           <a:bodyPr/>
           <a:lstStyle/>
           <a:p>
-            <a:fld id="{63262B27-BCFD-478F-A21D-598A0BF1DA83}" type="datetime1">
-              <a:rPr lang="en-US" smtClean="0"/>
-              <a:t>11/15/15</a:t>
+            <a:fld id="{7C8F896A-B34A-AD47-8FCF-F499DA82FFE4}" type="datetime1">
+              <a:rPr lang="en-US" smtClean="0"/>
+              <a:t>12/19/15</a:t>
             </a:fld>
             <a:endParaRPr lang="en-US"/>
           </a:p>
@@ -2261,8 +2257,8 @@
           <a:lstStyle/>
           <a:p>
             <a:r>
-              <a:rPr lang="en-US" smtClean="0"/>
-              <a:t>© 2015 EV3Lessons.com, Last edit 11/10/2015</a:t>
+              <a:rPr lang="sk-SK" smtClean="0"/>
+              <a:t>© 2015 EV3Lessons.com, Last edit 12/19/2015</a:t>
             </a:r>
             <a:endParaRPr lang="en-US"/>
           </a:p>
@@ -2700,9 +2696,9 @@
           <a:bodyPr/>
           <a:lstStyle/>
           <a:p>
-            <a:fld id="{FCE16FEE-4A79-4781-AACB-61C8F868F7BA}" type="datetime1">
-              <a:rPr lang="en-US" smtClean="0"/>
-              <a:t>11/15/15</a:t>
+            <a:fld id="{7D24E7B9-ACD4-CF44-8319-25E01A317645}" type="datetime1">
+              <a:rPr lang="en-US" smtClean="0"/>
+              <a:t>12/19/15</a:t>
             </a:fld>
             <a:endParaRPr lang="en-US" dirty="0"/>
           </a:p>
@@ -2724,8 +2720,8 @@
           <a:lstStyle/>
           <a:p>
             <a:r>
-              <a:rPr lang="en-US" smtClean="0"/>
-              <a:t>© 2015 EV3Lessons.com, Last edit 11/10/2015</a:t>
+              <a:rPr lang="sk-SK" smtClean="0"/>
+              <a:t>© 2015 EV3Lessons.com, Last edit 12/19/2015</a:t>
             </a:r>
             <a:endParaRPr lang="en-US" dirty="0"/>
           </a:p>
@@ -2779,7 +2775,6 @@
       </p:par>
     </p:tnLst>
   </p:timing>
-  <p:hf hdr="0" dt="0"/>
 </p:sldLayout>
 </file>
 
@@ -3165,9 +3160,9 @@
           <a:bodyPr/>
           <a:lstStyle/>
           <a:p>
-            <a:fld id="{C0284210-0621-4985-A7D5-2E097962EC1A}" type="datetime1">
-              <a:rPr lang="en-US" smtClean="0"/>
-              <a:t>11/15/15</a:t>
+            <a:fld id="{9B8A754F-0292-854F-9AF0-16B06A47A294}" type="datetime1">
+              <a:rPr lang="en-US" smtClean="0"/>
+              <a:t>12/19/15</a:t>
             </a:fld>
             <a:endParaRPr lang="en-US"/>
           </a:p>
@@ -3890,9 +3885,9 @@
           <a:bodyPr/>
           <a:lstStyle/>
           <a:p>
-            <a:fld id="{DE62B863-8F6A-4F0F-9561-6E711C04B361}" type="datetime1">
-              <a:rPr lang="en-US" smtClean="0"/>
-              <a:t>11/15/15</a:t>
+            <a:fld id="{FAC70B36-23F6-734C-8A9D-90C93AC344DC}" type="datetime1">
+              <a:rPr lang="en-US" smtClean="0"/>
+              <a:t>12/19/15</a:t>
             </a:fld>
             <a:endParaRPr lang="en-US"/>
           </a:p>
@@ -3914,8 +3909,8 @@
           <a:lstStyle/>
           <a:p>
             <a:r>
-              <a:rPr lang="en-US" smtClean="0"/>
-              <a:t>© 2015 EV3Lessons.com, Last edit 11/10/2015</a:t>
+              <a:rPr lang="sk-SK" smtClean="0"/>
+              <a:t>© 2015 EV3Lessons.com, Last edit 12/19/2015</a:t>
             </a:r>
             <a:endParaRPr lang="en-US"/>
           </a:p>
@@ -4172,9 +4167,9 @@
           <a:bodyPr/>
           <a:lstStyle/>
           <a:p>
-            <a:fld id="{7647E5A3-DA8C-4E40-8E2B-382623E75419}" type="datetime1">
-              <a:rPr lang="en-US" smtClean="0"/>
-              <a:t>11/15/15</a:t>
+            <a:fld id="{96771858-3FB0-4743-BA44-3B4AC6B763D9}" type="datetime1">
+              <a:rPr lang="en-US" smtClean="0"/>
+              <a:t>12/19/15</a:t>
             </a:fld>
             <a:endParaRPr lang="en-US"/>
           </a:p>
@@ -4196,8 +4191,8 @@
           <a:lstStyle/>
           <a:p>
             <a:r>
-              <a:rPr lang="en-US" smtClean="0"/>
-              <a:t>© 2015 EV3Lessons.com, Last edit 11/10/2015</a:t>
+              <a:rPr lang="sk-SK" smtClean="0"/>
+              <a:t>© 2015 EV3Lessons.com, Last edit 12/19/2015</a:t>
             </a:r>
             <a:endParaRPr lang="en-US"/>
           </a:p>
@@ -4492,9 +4487,9 @@
           <a:bodyPr/>
           <a:lstStyle/>
           <a:p>
-            <a:fld id="{2D62DFCC-42FA-4151-A3BC-7A02EE95FA20}" type="datetime1">
-              <a:rPr lang="en-US" smtClean="0"/>
-              <a:t>11/15/15</a:t>
+            <a:fld id="{31BA126B-14E6-B94E-BBAE-964A89DB4FC7}" type="datetime1">
+              <a:rPr lang="en-US" smtClean="0"/>
+              <a:t>12/19/15</a:t>
             </a:fld>
             <a:endParaRPr lang="en-US"/>
           </a:p>
@@ -4516,8 +4511,8 @@
           <a:lstStyle/>
           <a:p>
             <a:r>
-              <a:rPr lang="en-US" smtClean="0"/>
-              <a:t>© 2015 EV3Lessons.com, Last edit 11/10/2015</a:t>
+              <a:rPr lang="sk-SK" smtClean="0"/>
+              <a:t>© 2015 EV3Lessons.com, Last edit 12/19/2015</a:t>
             </a:r>
             <a:endParaRPr lang="en-US"/>
           </a:p>
@@ -4721,9 +4716,9 @@
           <a:bodyPr/>
           <a:lstStyle/>
           <a:p>
-            <a:fld id="{634138B8-64FD-4912-85B2-4445A010F270}" type="datetime1">
-              <a:rPr lang="en-US" smtClean="0"/>
-              <a:t>11/15/15</a:t>
+            <a:fld id="{088593D8-00E2-0741-9BAE-C9D19486700E}" type="datetime1">
+              <a:rPr lang="en-US" smtClean="0"/>
+              <a:t>12/19/15</a:t>
             </a:fld>
             <a:endParaRPr lang="en-US"/>
           </a:p>
@@ -4745,8 +4740,8 @@
           <a:lstStyle/>
           <a:p>
             <a:r>
-              <a:rPr lang="en-US" smtClean="0"/>
-              <a:t>© 2015 EV3Lessons.com, Last edit 11/10/2015</a:t>
+              <a:rPr lang="sk-SK" smtClean="0"/>
+              <a:t>© 2015 EV3Lessons.com, Last edit 12/19/2015</a:t>
             </a:r>
             <a:endParaRPr lang="en-US"/>
           </a:p>
@@ -5008,9 +5003,9 @@
           <a:bodyPr/>
           <a:lstStyle/>
           <a:p>
-            <a:fld id="{FCE16FEE-4A79-4781-AACB-61C8F868F7BA}" type="datetime1">
-              <a:rPr lang="en-US" smtClean="0"/>
-              <a:t>11/15/15</a:t>
+            <a:fld id="{8962EFE1-8801-6C43-A80F-133BD912E9C2}" type="datetime1">
+              <a:rPr lang="en-US" smtClean="0"/>
+              <a:t>12/19/15</a:t>
             </a:fld>
             <a:endParaRPr lang="en-US" dirty="0"/>
           </a:p>
@@ -5032,8 +5027,8 @@
           <a:lstStyle/>
           <a:p>
             <a:r>
-              <a:rPr lang="en-US" smtClean="0"/>
-              <a:t>© 2015 EV3Lessons.com, Last edit 11/10/2015</a:t>
+              <a:rPr lang="sk-SK" smtClean="0"/>
+              <a:t>© 2015 EV3Lessons.com, Last edit 12/19/2015</a:t>
             </a:r>
             <a:endParaRPr lang="en-US" dirty="0"/>
           </a:p>
@@ -5129,7 +5124,6 @@
   <p:clrMapOvr>
     <a:masterClrMapping/>
   </p:clrMapOvr>
-  <p:hf hdr="0" dt="0"/>
 </p:sldLayout>
 </file>
 
@@ -5253,9 +5247,9 @@
             </a:lvl1pPr>
           </a:lstStyle>
           <a:p>
-            <a:fld id="{FCE16FEE-4A79-4781-AACB-61C8F868F7BA}" type="datetime1">
-              <a:rPr lang="en-US" smtClean="0"/>
-              <a:t>11/15/15</a:t>
+            <a:fld id="{8CD010E8-97D7-9048-AC65-0E3AE1CFFEF1}" type="datetime1">
+              <a:rPr lang="en-US" smtClean="0"/>
+              <a:t>12/19/15</a:t>
             </a:fld>
             <a:endParaRPr lang="en-US" dirty="0"/>
           </a:p>
@@ -5295,8 +5289,8 @@
           </a:lstStyle>
           <a:p>
             <a:r>
-              <a:rPr lang="en-US" smtClean="0"/>
-              <a:t>© 2015 EV3Lessons.com, Last edit 11/10/2015</a:t>
+              <a:rPr lang="sk-SK" smtClean="0"/>
+              <a:t>© 2015 EV3Lessons.com, Last edit 12/19/2015</a:t>
             </a:r>
             <a:endParaRPr lang="en-US" dirty="0"/>
           </a:p>
@@ -5810,272 +5804,47 @@
       </p:sp>
       <p:sp>
         <p:nvSpPr>
-          <p:cNvPr id="17" name="Subtitle 3"/>
-          <p:cNvSpPr txBox="1">
-            <a:spLocks/>
-          </p:cNvSpPr>
-          <p:nvPr/>
-        </p:nvSpPr>
-        <p:spPr>
-          <a:xfrm>
-            <a:off x="3314843" y="5886037"/>
-            <a:ext cx="3749229" cy="484094"/>
-          </a:xfrm>
-          <a:prstGeom prst="rect">
-            <a:avLst/>
-          </a:prstGeom>
-        </p:spPr>
-        <p:txBody>
-          <a:bodyPr vert="horz" lIns="91440" tIns="45720" rIns="91440" bIns="45720" rtlCol="0">
-            <a:normAutofit fontScale="85000" lnSpcReduction="10000"/>
-          </a:bodyPr>
-          <a:lstStyle>
-            <a:lvl1pPr marL="0" indent="0" algn="l" defTabSz="914400" rtl="0" eaLnBrk="1" latinLnBrk="0" hangingPunct="1">
-              <a:lnSpc>
-                <a:spcPct val="100000"/>
-              </a:lnSpc>
-              <a:spcBef>
-                <a:spcPts val="0"/>
-              </a:spcBef>
-              <a:buClr>
-                <a:schemeClr val="bg1">
-                  <a:lumMod val="65000"/>
-                </a:schemeClr>
-              </a:buClr>
-              <a:buSzPct val="90000"/>
-              <a:buFont typeface="Wingdings" pitchFamily="2" charset="2"/>
-              <a:buNone/>
-              <a:defRPr sz="1800" kern="1200">
-                <a:solidFill>
-                  <a:schemeClr val="bg1"/>
-                </a:solidFill>
-                <a:latin typeface="+mn-lt"/>
-                <a:ea typeface="+mn-ea"/>
-                <a:cs typeface="+mn-cs"/>
-              </a:defRPr>
-            </a:lvl1pPr>
-            <a:lvl2pPr marL="457200" indent="0" algn="ctr" defTabSz="914400" rtl="0" eaLnBrk="1" latinLnBrk="0" hangingPunct="1">
-              <a:spcBef>
-                <a:spcPts val="600"/>
-              </a:spcBef>
-              <a:buClr>
-                <a:schemeClr val="tx1">
-                  <a:lumMod val="75000"/>
-                  <a:lumOff val="25000"/>
-                </a:schemeClr>
-              </a:buClr>
-              <a:buSzPct val="90000"/>
-              <a:buFont typeface="Wingdings" pitchFamily="2" charset="2"/>
-              <a:buNone/>
-              <a:defRPr sz="2200" kern="1200">
-                <a:solidFill>
-                  <a:schemeClr val="tx1">
-                    <a:tint val="75000"/>
-                  </a:schemeClr>
-                </a:solidFill>
-                <a:latin typeface="+mn-lt"/>
-                <a:ea typeface="+mn-ea"/>
-                <a:cs typeface="+mn-cs"/>
-              </a:defRPr>
-            </a:lvl2pPr>
-            <a:lvl3pPr marL="914400" indent="0" algn="ctr" defTabSz="914400" rtl="0" eaLnBrk="1" latinLnBrk="0" hangingPunct="1">
-              <a:spcBef>
-                <a:spcPts val="600"/>
-              </a:spcBef>
-              <a:buClr>
-                <a:schemeClr val="bg1">
-                  <a:lumMod val="65000"/>
-                </a:schemeClr>
-              </a:buClr>
-              <a:buSzPct val="90000"/>
-              <a:buFont typeface="Wingdings" pitchFamily="2" charset="2"/>
-              <a:buNone/>
-              <a:defRPr sz="2000" kern="1200">
-                <a:solidFill>
-                  <a:schemeClr val="tx1">
-                    <a:tint val="75000"/>
-                  </a:schemeClr>
-                </a:solidFill>
-                <a:latin typeface="+mn-lt"/>
-                <a:ea typeface="+mn-ea"/>
-                <a:cs typeface="+mn-cs"/>
-              </a:defRPr>
-            </a:lvl3pPr>
-            <a:lvl4pPr marL="1371600" indent="0" algn="ctr" defTabSz="914400" rtl="0" eaLnBrk="1" latinLnBrk="0" hangingPunct="1">
-              <a:spcBef>
-                <a:spcPts val="600"/>
-              </a:spcBef>
-              <a:buClr>
-                <a:schemeClr val="tx1">
-                  <a:lumMod val="75000"/>
-                  <a:lumOff val="25000"/>
-                </a:schemeClr>
-              </a:buClr>
-              <a:buSzPct val="90000"/>
-              <a:buFont typeface="Wingdings" pitchFamily="2" charset="2"/>
-              <a:buNone/>
-              <a:defRPr sz="1800" kern="1200">
-                <a:solidFill>
-                  <a:schemeClr val="tx1">
-                    <a:tint val="75000"/>
-                  </a:schemeClr>
-                </a:solidFill>
-                <a:latin typeface="+mn-lt"/>
-                <a:ea typeface="+mn-ea"/>
-                <a:cs typeface="+mn-cs"/>
-              </a:defRPr>
-            </a:lvl4pPr>
-            <a:lvl5pPr marL="1828800" indent="0" algn="ctr" defTabSz="914400" rtl="0" eaLnBrk="1" latinLnBrk="0" hangingPunct="1">
-              <a:spcBef>
-                <a:spcPts val="600"/>
-              </a:spcBef>
-              <a:buClr>
-                <a:schemeClr val="bg1">
-                  <a:lumMod val="65000"/>
-                </a:schemeClr>
-              </a:buClr>
-              <a:buSzPct val="90000"/>
-              <a:buFont typeface="Wingdings" pitchFamily="2" charset="2"/>
-              <a:buNone/>
-              <a:defRPr sz="1800" kern="1200">
-                <a:solidFill>
-                  <a:schemeClr val="tx1">
-                    <a:tint val="75000"/>
-                  </a:schemeClr>
-                </a:solidFill>
-                <a:latin typeface="+mn-lt"/>
-                <a:ea typeface="+mn-ea"/>
-                <a:cs typeface="+mn-cs"/>
-              </a:defRPr>
-            </a:lvl5pPr>
-            <a:lvl6pPr marL="2286000" indent="0" algn="ctr" defTabSz="914400" rtl="0" eaLnBrk="1" latinLnBrk="0" hangingPunct="1">
-              <a:spcBef>
-                <a:spcPts val="600"/>
-              </a:spcBef>
-              <a:buClr>
-                <a:schemeClr val="tx1">
-                  <a:lumMod val="75000"/>
-                  <a:lumOff val="25000"/>
-                </a:schemeClr>
-              </a:buClr>
-              <a:buSzPct val="90000"/>
-              <a:buFont typeface="Wingdings" pitchFamily="2" charset="2"/>
-              <a:buNone/>
-              <a:defRPr lang="en-US" sz="1800" kern="1200">
-                <a:solidFill>
-                  <a:schemeClr val="tx1">
-                    <a:tint val="75000"/>
-                  </a:schemeClr>
-                </a:solidFill>
-                <a:latin typeface="+mn-lt"/>
-                <a:ea typeface="+mn-ea"/>
-                <a:cs typeface="+mn-cs"/>
-              </a:defRPr>
-            </a:lvl6pPr>
-            <a:lvl7pPr marL="2743200" indent="0" algn="ctr" defTabSz="914400" rtl="0" eaLnBrk="1" latinLnBrk="0" hangingPunct="1">
-              <a:spcBef>
-                <a:spcPts val="600"/>
-              </a:spcBef>
-              <a:buClr>
-                <a:schemeClr val="bg1">
-                  <a:lumMod val="65000"/>
-                </a:schemeClr>
-              </a:buClr>
-              <a:buSzPct val="90000"/>
-              <a:buFont typeface="Wingdings" pitchFamily="2" charset="2"/>
-              <a:buNone/>
-              <a:defRPr lang="en-US" sz="1800" kern="1200">
-                <a:solidFill>
-                  <a:schemeClr val="tx1">
-                    <a:tint val="75000"/>
-                  </a:schemeClr>
-                </a:solidFill>
-                <a:latin typeface="+mn-lt"/>
-                <a:ea typeface="+mn-ea"/>
-                <a:cs typeface="+mn-cs"/>
-              </a:defRPr>
-            </a:lvl7pPr>
-            <a:lvl8pPr marL="3200400" indent="0" algn="ctr" defTabSz="914400" rtl="0" eaLnBrk="1" latinLnBrk="0" hangingPunct="1">
-              <a:spcBef>
-                <a:spcPts val="600"/>
-              </a:spcBef>
-              <a:buClr>
-                <a:schemeClr val="tx1">
-                  <a:lumMod val="75000"/>
-                  <a:lumOff val="25000"/>
-                </a:schemeClr>
-              </a:buClr>
-              <a:buSzPct val="90000"/>
-              <a:buFont typeface="Wingdings" pitchFamily="2" charset="2"/>
-              <a:buNone/>
-              <a:defRPr lang="en-US" sz="1800" kern="1200">
-                <a:solidFill>
-                  <a:schemeClr val="tx1">
-                    <a:tint val="75000"/>
-                  </a:schemeClr>
-                </a:solidFill>
-                <a:latin typeface="+mn-lt"/>
-                <a:ea typeface="+mn-ea"/>
-                <a:cs typeface="+mn-cs"/>
-              </a:defRPr>
-            </a:lvl8pPr>
-            <a:lvl9pPr marL="3657600" indent="0" algn="ctr" defTabSz="914400" rtl="0" eaLnBrk="1" latinLnBrk="0" hangingPunct="1">
-              <a:spcBef>
-                <a:spcPts val="600"/>
-              </a:spcBef>
-              <a:buClr>
-                <a:schemeClr val="bg1">
-                  <a:lumMod val="65000"/>
-                </a:schemeClr>
-              </a:buClr>
-              <a:buSzPct val="90000"/>
-              <a:buFont typeface="Wingdings" pitchFamily="2" charset="2"/>
-              <a:buNone/>
-              <a:defRPr lang="en-US" sz="1800" kern="1200">
-                <a:solidFill>
-                  <a:schemeClr val="tx1">
-                    <a:tint val="75000"/>
-                  </a:schemeClr>
-                </a:solidFill>
-                <a:latin typeface="+mn-lt"/>
-                <a:ea typeface="+mn-ea"/>
-                <a:cs typeface="+mn-cs"/>
-              </a:defRPr>
-            </a:lvl9pPr>
-          </a:lstStyle>
-          <a:p>
-            <a:r>
-              <a:rPr lang="en-US">
-                <a:solidFill>
-                  <a:schemeClr val="tx1"/>
-                </a:solidFill>
-              </a:rPr>
-              <a:t>w</a:t>
-            </a:r>
-            <a:r>
-              <a:rPr lang="en-US" smtClean="0">
-                <a:solidFill>
-                  <a:schemeClr val="tx1"/>
-                </a:solidFill>
-              </a:rPr>
-              <a:t>ith </a:t>
-            </a:r>
-            <a:r>
-              <a:rPr lang="en-US" dirty="0" smtClean="0">
-                <a:solidFill>
-                  <a:schemeClr val="tx1"/>
-                </a:solidFill>
-              </a:rPr>
-              <a:t>code from the Construction </a:t>
-            </a:r>
-            <a:r>
-              <a:rPr lang="en-US" dirty="0" smtClean="0">
-                <a:solidFill>
-                  <a:schemeClr val="tx1"/>
-                </a:solidFill>
-              </a:rPr>
-              <a:t>Mavericks</a:t>
-            </a:r>
+          <p:cNvPr id="3" name="Footer Placeholder 2"/>
+          <p:cNvSpPr>
+            <a:spLocks noGrp="1"/>
+          </p:cNvSpPr>
+          <p:nvPr>
+            <p:ph type="ftr" sz="quarter" idx="11"/>
+          </p:nvPr>
+        </p:nvSpPr>
+        <p:spPr/>
+        <p:txBody>
+          <a:bodyPr/>
+          <a:lstStyle/>
+          <a:p>
+            <a:r>
+              <a:rPr lang="sk-SK" smtClean="0"/>
+              <a:t>© 2015 EV3Lessons.com, Last edit 12/19/2015</a:t>
+            </a:r>
+            <a:endParaRPr lang="en-US"/>
+          </a:p>
+        </p:txBody>
+      </p:sp>
+      <p:sp>
+        <p:nvSpPr>
+          <p:cNvPr id="4" name="Slide Number Placeholder 3"/>
+          <p:cNvSpPr>
+            <a:spLocks noGrp="1"/>
+          </p:cNvSpPr>
+          <p:nvPr>
+            <p:ph type="sldNum" sz="quarter" idx="12"/>
+          </p:nvPr>
+        </p:nvSpPr>
+        <p:spPr/>
+        <p:txBody>
+          <a:bodyPr/>
+          <a:lstStyle/>
+          <a:p>
+            <a:fld id="{7F5CE407-6216-4202-80E4-A30DC2F709B2}" type="slidenum">
+              <a:rPr lang="en-US" smtClean="0"/>
+              <a:t>1</a:t>
+            </a:fld>
+            <a:endParaRPr lang="en-US"/>
           </a:p>
         </p:txBody>
       </p:sp>
@@ -6132,8 +5901,8 @@
           <a:lstStyle/>
           <a:p>
             <a:r>
-              <a:rPr lang="en-US" smtClean="0"/>
-              <a:t>© 2015 EV3Lessons.com, Last edit 11/10/2015</a:t>
+              <a:rPr lang="sk-SK" smtClean="0"/>
+              <a:t>© 2015 EV3Lessons.com, Last edit 12/19/2015</a:t>
             </a:r>
             <a:endParaRPr lang="en-US" dirty="0"/>
           </a:p>
@@ -6358,8 +6127,8 @@
           <a:lstStyle/>
           <a:p>
             <a:r>
-              <a:rPr lang="en-US" smtClean="0"/>
-              <a:t>© 2015 EV3Lessons.com, Last edit 11/10/2015</a:t>
+              <a:rPr lang="sk-SK" smtClean="0"/>
+              <a:t>© 2015 EV3Lessons.com, Last edit 12/19/2015</a:t>
             </a:r>
             <a:endParaRPr lang="en-US" dirty="0"/>
           </a:p>
@@ -6495,8 +6264,8 @@
           <a:lstStyle/>
           <a:p>
             <a:r>
-              <a:rPr lang="en-US" smtClean="0"/>
-              <a:t>© 2015 EV3Lessons.com, Last edit 11/10/2015</a:t>
+              <a:rPr lang="sk-SK" smtClean="0"/>
+              <a:t>© 2015 EV3Lessons.com, Last edit 12/19/2015</a:t>
             </a:r>
             <a:endParaRPr lang="en-US" dirty="0"/>
           </a:p>
@@ -6632,8 +6401,8 @@
           <a:lstStyle/>
           <a:p>
             <a:r>
-              <a:rPr lang="en-US" smtClean="0"/>
-              <a:t>© 2015 EV3Lessons.com, Last edit 11/10/2015</a:t>
+              <a:rPr lang="sk-SK" smtClean="0"/>
+              <a:t>© 2015 EV3Lessons.com, Last edit 12/19/2015</a:t>
             </a:r>
             <a:endParaRPr lang="en-US" dirty="0"/>
           </a:p>
@@ -6765,49 +6534,47 @@
         </p:nvSpPr>
         <p:spPr/>
         <p:txBody>
-          <a:bodyPr>
-            <a:normAutofit fontScale="85000" lnSpcReduction="20000"/>
-          </a:bodyPr>
-          <a:lstStyle/>
-          <a:p>
-            <a:r>
-              <a:rPr lang="en-US" smtClean="0"/>
-              <a:t>The remainder of this lesson is a contribution by The Construction Mavericks.</a:t>
-            </a:r>
-          </a:p>
-          <a:p>
-            <a:r>
-              <a:rPr lang="en-US" smtClean="0"/>
-              <a:t>This method improves over the simple overshoot correction mechanism from earlier by using proportional control</a:t>
+          <a:bodyPr/>
+          <a:lstStyle/>
+          <a:p>
+            <a:r>
+              <a:rPr lang="en-US" dirty="0" smtClean="0"/>
+              <a:t>What is gyro lag?</a:t>
+            </a:r>
+          </a:p>
+          <a:p>
+            <a:pPr marL="457200" lvl="1" indent="0">
+              <a:buNone/>
+            </a:pPr>
+            <a:r>
+              <a:rPr lang="en-US" dirty="0" smtClean="0"/>
+              <a:t>Ans. The gyro sensor’s reading lags behind the true reading</a:t>
             </a:r>
           </a:p>
           <a:p>
             <a:pPr lvl="1"/>
-            <a:r>
-              <a:rPr lang="en-US" smtClean="0"/>
-              <a:t>If you are unfamiliar with proportional control, please see the advanced lesson on proportional control before continuing.</a:t>
-            </a:r>
-          </a:p>
-          <a:p>
-            <a:pPr lvl="1"/>
-            <a:r>
-              <a:rPr lang="en-US" smtClean="0"/>
-              <a:t>The basic idea is to use the current gyro position and where it wants to point to determine how to set the motor power.  </a:t>
-            </a:r>
-          </a:p>
-          <a:p>
-            <a:r>
-              <a:rPr lang="en-US" smtClean="0"/>
-              <a:t>Note from Construction Mavericks: It's not perfect, but we have had much better success with these blocks than the overshoot-corrected ones.  </a:t>
-            </a:r>
-          </a:p>
-          <a:p>
-            <a:r>
-              <a:rPr lang="en-US" smtClean="0"/>
-              <a:t>Tip from Construction Mavericks: Try to set the outer loop to an infinite loop.  Once the robot settles into place, pick it up and rotate it and watch it try to get back to where it wants to be.</a:t>
+            <a:endParaRPr lang="en-US" dirty="0" smtClean="0"/>
+          </a:p>
+          <a:p>
+            <a:r>
+              <a:rPr lang="en-US" dirty="0" smtClean="0"/>
+              <a:t>What is one way to compensate for lag?</a:t>
             </a:r>
             <a:endParaRPr lang="en-US" dirty="0"/>
           </a:p>
+          <a:p>
+            <a:pPr marL="457200" lvl="1" indent="0">
+              <a:buNone/>
+            </a:pPr>
+            <a:r>
+              <a:rPr lang="en-US" dirty="0" err="1" smtClean="0"/>
+              <a:t>Ans</a:t>
+            </a:r>
+            <a:r>
+              <a:rPr lang="en-US" dirty="0" smtClean="0"/>
+              <a:t>: Reduce the number of degrees that you turn</a:t>
+            </a:r>
+          </a:p>
         </p:txBody>
       </p:sp>
       <p:sp>
@@ -6826,8 +6593,8 @@
           <a:lstStyle/>
           <a:p>
             <a:r>
-              <a:rPr lang="en-US" smtClean="0"/>
-              <a:t>© 2015 EV3Lessons.com, Last edit 11/10/2015</a:t>
+              <a:rPr lang="sk-SK" smtClean="0"/>
+              <a:t>© 2015 EV3Lessons.com, Last edit 12/19/2015</a:t>
             </a:r>
             <a:endParaRPr lang="en-US" dirty="0"/>
           </a:p>
@@ -6835,7 +6602,7 @@
       </p:sp>
       <p:sp>
         <p:nvSpPr>
-          <p:cNvPr id="5" name="Slide Number Placeholder 4"/>
+          <p:cNvPr id="7" name="Slide Number Placeholder 6"/>
           <p:cNvSpPr>
             <a:spLocks noGrp="1"/>
           </p:cNvSpPr>
@@ -6852,953 +6619,6 @@
               <a:rPr lang="en-US" smtClean="0"/>
               <a:pPr/>
               <a:t>14</a:t>
-            </a:fld>
-            <a:endParaRPr lang="en-US" dirty="0"/>
-          </a:p>
-        </p:txBody>
-      </p:sp>
-      <p:sp>
-        <p:nvSpPr>
-          <p:cNvPr id="2" name="Title 1"/>
-          <p:cNvSpPr>
-            <a:spLocks noGrp="1"/>
-          </p:cNvSpPr>
-          <p:nvPr>
-            <p:ph type="title"/>
-          </p:nvPr>
-        </p:nvSpPr>
-        <p:spPr/>
-        <p:txBody>
-          <a:bodyPr>
-            <a:normAutofit fontScale="90000"/>
-          </a:bodyPr>
-          <a:lstStyle/>
-          <a:p>
-            <a:r>
-              <a:rPr lang="en-US" smtClean="0"/>
-              <a:t>Proportional Gyro Turns</a:t>
-            </a:r>
-            <a:br>
-              <a:rPr lang="en-US" smtClean="0"/>
-            </a:br>
-            <a:r>
-              <a:rPr lang="en-US" smtClean="0"/>
-              <a:t>by The Construction Mavericks</a:t>
-            </a:r>
-            <a:endParaRPr lang="en-US" dirty="0"/>
-          </a:p>
-        </p:txBody>
-      </p:sp>
-    </p:spTree>
-    <p:extLst>
-      <p:ext uri="{BB962C8B-B14F-4D97-AF65-F5344CB8AC3E}">
-        <p14:creationId xmlns:p14="http://schemas.microsoft.com/office/powerpoint/2010/main" val="3719007101"/>
-      </p:ext>
-    </p:extLst>
-  </p:cSld>
-  <p:clrMapOvr>
-    <a:masterClrMapping/>
-  </p:clrMapOvr>
-  <p:timing>
-    <p:tnLst>
-      <p:par>
-        <p:cTn id="1" dur="indefinite" restart="never" nodeType="tmRoot"/>
-      </p:par>
-    </p:tnLst>
-  </p:timing>
-</p:sld>
-</file>
-
-<file path=ppt/slides/slide15.xml><?xml version="1.0" encoding="utf-8"?>
-<p:sld xmlns:a="http://schemas.openxmlformats.org/drawingml/2006/main" xmlns:r="http://schemas.openxmlformats.org/officeDocument/2006/relationships" xmlns:p="http://schemas.openxmlformats.org/presentationml/2006/main">
-  <p:cSld>
-    <p:spTree>
-      <p:nvGrpSpPr>
-        <p:cNvPr id="1" name=""/>
-        <p:cNvGrpSpPr/>
-        <p:nvPr/>
-      </p:nvGrpSpPr>
-      <p:grpSpPr>
-        <a:xfrm>
-          <a:off x="0" y="0"/>
-          <a:ext cx="0" cy="0"/>
-          <a:chOff x="0" y="0"/>
-          <a:chExt cx="0" cy="0"/>
-        </a:xfrm>
-      </p:grpSpPr>
-      <p:sp>
-        <p:nvSpPr>
-          <p:cNvPr id="3" name="Content Placeholder 2"/>
-          <p:cNvSpPr>
-            <a:spLocks noGrp="1"/>
-          </p:cNvSpPr>
-          <p:nvPr>
-            <p:ph idx="1"/>
-          </p:nvPr>
-        </p:nvSpPr>
-        <p:spPr>
-          <a:xfrm>
-            <a:off x="284163" y="1818870"/>
-            <a:ext cx="8395379" cy="4307294"/>
-          </a:xfrm>
-        </p:spPr>
-        <p:txBody>
-          <a:bodyPr>
-            <a:normAutofit/>
-          </a:bodyPr>
-          <a:lstStyle/>
-          <a:p>
-            <a:pPr marL="457200" indent="-457200">
-              <a:buAutoNum type="arabicParenR"/>
-            </a:pPr>
-            <a:r>
-              <a:rPr lang="en-US" dirty="0"/>
-              <a:t>R</a:t>
-            </a:r>
-            <a:r>
-              <a:rPr lang="en-US" dirty="0" smtClean="0"/>
-              <a:t>ead </a:t>
-            </a:r>
-            <a:r>
-              <a:rPr lang="en-US" dirty="0"/>
-              <a:t>the gyro </a:t>
-            </a:r>
-            <a:r>
-              <a:rPr lang="en-US" dirty="0" smtClean="0"/>
-              <a:t>value</a:t>
-            </a:r>
-          </a:p>
-          <a:p>
-            <a:pPr marL="457200" indent="-457200">
-              <a:buAutoNum type="arabicParenR"/>
-            </a:pPr>
-            <a:r>
-              <a:rPr lang="en-US" dirty="0" smtClean="0"/>
-              <a:t>Compute Error: Subtract </a:t>
-            </a:r>
-            <a:r>
-              <a:rPr lang="en-US" dirty="0"/>
-              <a:t>the gyro value from </a:t>
-            </a:r>
-            <a:r>
-              <a:rPr lang="en-US" dirty="0" smtClean="0"/>
-              <a:t>the target amount of degrees to turn. </a:t>
-            </a:r>
-            <a:r>
-              <a:rPr lang="en-US" dirty="0"/>
-              <a:t>Use scaling </a:t>
-            </a:r>
-            <a:r>
-              <a:rPr lang="en-US" dirty="0" smtClean="0"/>
-              <a:t>(multiply to tweak how much to adjust the power) if </a:t>
-            </a:r>
-            <a:r>
-              <a:rPr lang="en-US" dirty="0"/>
-              <a:t>necessary</a:t>
-            </a:r>
-            <a:r>
-              <a:rPr lang="en-US" dirty="0" smtClean="0"/>
-              <a:t>.</a:t>
-            </a:r>
-          </a:p>
-          <a:p>
-            <a:pPr marL="457200" indent="-457200">
-              <a:buAutoNum type="arabicParenR"/>
-            </a:pPr>
-            <a:r>
-              <a:rPr lang="en-US" dirty="0" smtClean="0"/>
-              <a:t>Apply Correction: Use data wires to wire </a:t>
-            </a:r>
-            <a:r>
-              <a:rPr lang="en-US" dirty="0"/>
-              <a:t>the result </a:t>
-            </a:r>
-            <a:r>
-              <a:rPr lang="en-US" dirty="0" smtClean="0"/>
-              <a:t>from the previous step to </a:t>
-            </a:r>
-            <a:r>
-              <a:rPr lang="en-US" dirty="0"/>
-              <a:t>the M</a:t>
-            </a:r>
-            <a:r>
-              <a:rPr lang="en-US" dirty="0" smtClean="0"/>
-              <a:t>ove </a:t>
-            </a:r>
-            <a:r>
-              <a:rPr lang="en-US" dirty="0"/>
-              <a:t>S</a:t>
-            </a:r>
-            <a:r>
-              <a:rPr lang="en-US" dirty="0" smtClean="0"/>
-              <a:t>teering block’s power input, with steering 50</a:t>
-            </a:r>
-          </a:p>
-          <a:p>
-            <a:pPr marL="457200" indent="-457200">
-              <a:buAutoNum type="arabicParenR"/>
-            </a:pPr>
-            <a:r>
-              <a:rPr lang="en-US" dirty="0"/>
-              <a:t> Repeat for the specified duration</a:t>
-            </a:r>
-          </a:p>
-        </p:txBody>
-      </p:sp>
-      <p:sp>
-        <p:nvSpPr>
-          <p:cNvPr id="4" name="Footer Placeholder 3"/>
-          <p:cNvSpPr>
-            <a:spLocks noGrp="1"/>
-          </p:cNvSpPr>
-          <p:nvPr>
-            <p:ph type="ftr" sz="quarter" idx="11"/>
-          </p:nvPr>
-        </p:nvSpPr>
-        <p:spPr/>
-        <p:txBody>
-          <a:bodyPr/>
-          <a:lstStyle/>
-          <a:p>
-            <a:r>
-              <a:rPr lang="en-US" dirty="0" smtClean="0"/>
-              <a:t>© 2015 EV3Lessons.com, Last edit 11/10/2015</a:t>
-            </a:r>
-            <a:endParaRPr lang="en-US" dirty="0"/>
-          </a:p>
-        </p:txBody>
-      </p:sp>
-      <p:sp>
-        <p:nvSpPr>
-          <p:cNvPr id="5" name="Slide Number Placeholder 4"/>
-          <p:cNvSpPr>
-            <a:spLocks noGrp="1"/>
-          </p:cNvSpPr>
-          <p:nvPr>
-            <p:ph type="sldNum" sz="quarter" idx="12"/>
-          </p:nvPr>
-        </p:nvSpPr>
-        <p:spPr/>
-        <p:txBody>
-          <a:bodyPr/>
-          <a:lstStyle/>
-          <a:p>
-            <a:fld id="{4382A7F7-08BF-4252-8141-63FB96055BBB}" type="slidenum">
-              <a:rPr lang="en-US" smtClean="0"/>
-              <a:t>15</a:t>
-            </a:fld>
-            <a:endParaRPr lang="en-US" dirty="0"/>
-          </a:p>
-        </p:txBody>
-      </p:sp>
-      <p:sp>
-        <p:nvSpPr>
-          <p:cNvPr id="2" name="Title 1"/>
-          <p:cNvSpPr>
-            <a:spLocks noGrp="1"/>
-          </p:cNvSpPr>
-          <p:nvPr>
-            <p:ph type="title"/>
-          </p:nvPr>
-        </p:nvSpPr>
-        <p:spPr/>
-        <p:txBody>
-          <a:bodyPr/>
-          <a:lstStyle/>
-          <a:p>
-            <a:r>
-              <a:rPr lang="en-US" dirty="0" smtClean="0"/>
-              <a:t>Sample: Proportional Gyro Right Turn</a:t>
-            </a:r>
-            <a:endParaRPr lang="en-US" dirty="0"/>
-          </a:p>
-        </p:txBody>
-      </p:sp>
-    </p:spTree>
-    <p:extLst>
-      <p:ext uri="{BB962C8B-B14F-4D97-AF65-F5344CB8AC3E}">
-        <p14:creationId xmlns:p14="http://schemas.microsoft.com/office/powerpoint/2010/main" val="1567009795"/>
-      </p:ext>
-    </p:extLst>
-  </p:cSld>
-  <p:clrMapOvr>
-    <a:masterClrMapping/>
-  </p:clrMapOvr>
-  <p:timing>
-    <p:tnLst>
-      <p:par>
-        <p:cTn id="1" dur="indefinite" restart="never" nodeType="tmRoot"/>
-      </p:par>
-    </p:tnLst>
-  </p:timing>
-</p:sld>
-</file>
-
-<file path=ppt/slides/slide16.xml><?xml version="1.0" encoding="utf-8"?>
-<p:sld xmlns:a="http://schemas.openxmlformats.org/drawingml/2006/main" xmlns:r="http://schemas.openxmlformats.org/officeDocument/2006/relationships" xmlns:p="http://schemas.openxmlformats.org/presentationml/2006/main">
-  <p:cSld>
-    <p:spTree>
-      <p:nvGrpSpPr>
-        <p:cNvPr id="1" name=""/>
-        <p:cNvGrpSpPr/>
-        <p:nvPr/>
-      </p:nvGrpSpPr>
-      <p:grpSpPr>
-        <a:xfrm>
-          <a:off x="0" y="0"/>
-          <a:ext cx="0" cy="0"/>
-          <a:chOff x="0" y="0"/>
-          <a:chExt cx="0" cy="0"/>
-        </a:xfrm>
-      </p:grpSpPr>
-      <p:pic>
-        <p:nvPicPr>
-          <p:cNvPr id="9" name="Content Placeholder 8" descr="Screen Clipping"/>
-          <p:cNvPicPr>
-            <a:picLocks noGrp="1" noChangeAspect="1"/>
-          </p:cNvPicPr>
-          <p:nvPr>
-            <p:ph idx="1"/>
-          </p:nvPr>
-        </p:nvPicPr>
-        <p:blipFill>
-          <a:blip r:embed="rId2" cstate="email">
-            <a:extLst>
-              <a:ext uri="{28A0092B-C50C-407E-A947-70E740481C1C}">
-                <a14:useLocalDpi xmlns:a14="http://schemas.microsoft.com/office/drawing/2010/main" val="0"/>
-              </a:ext>
-            </a:extLst>
-          </a:blip>
-          <a:stretch>
-            <a:fillRect/>
-          </a:stretch>
-        </p:blipFill>
-        <p:spPr>
-          <a:xfrm>
-            <a:off x="284163" y="2077451"/>
-            <a:ext cx="8574087" cy="3790536"/>
-          </a:xfrm>
-        </p:spPr>
-      </p:pic>
-      <p:sp>
-        <p:nvSpPr>
-          <p:cNvPr id="4" name="Footer Placeholder 3"/>
-          <p:cNvSpPr>
-            <a:spLocks noGrp="1"/>
-          </p:cNvSpPr>
-          <p:nvPr>
-            <p:ph type="ftr" sz="quarter" idx="11"/>
-          </p:nvPr>
-        </p:nvSpPr>
-        <p:spPr/>
-        <p:txBody>
-          <a:bodyPr/>
-          <a:lstStyle/>
-          <a:p>
-            <a:r>
-              <a:rPr lang="en-US" smtClean="0"/>
-              <a:t>© 2015 EV3Lessons.com, Last edit 11/10/2015</a:t>
-            </a:r>
-            <a:endParaRPr lang="en-US" dirty="0"/>
-          </a:p>
-        </p:txBody>
-      </p:sp>
-      <p:sp>
-        <p:nvSpPr>
-          <p:cNvPr id="3" name="Slide Number Placeholder 2"/>
-          <p:cNvSpPr>
-            <a:spLocks noGrp="1"/>
-          </p:cNvSpPr>
-          <p:nvPr>
-            <p:ph type="sldNum" sz="quarter" idx="12"/>
-          </p:nvPr>
-        </p:nvSpPr>
-        <p:spPr/>
-        <p:txBody>
-          <a:bodyPr/>
-          <a:lstStyle/>
-          <a:p>
-            <a:fld id="{4382A7F7-08BF-4252-8141-63FB96055BBB}" type="slidenum">
-              <a:rPr lang="en-US" smtClean="0"/>
-              <a:pPr/>
-              <a:t>16</a:t>
-            </a:fld>
-            <a:endParaRPr lang="en-US" dirty="0"/>
-          </a:p>
-        </p:txBody>
-      </p:sp>
-      <p:sp>
-        <p:nvSpPr>
-          <p:cNvPr id="2" name="Title 1"/>
-          <p:cNvSpPr>
-            <a:spLocks noGrp="1"/>
-          </p:cNvSpPr>
-          <p:nvPr>
-            <p:ph type="title"/>
-          </p:nvPr>
-        </p:nvSpPr>
-        <p:spPr/>
-        <p:txBody>
-          <a:bodyPr/>
-          <a:lstStyle/>
-          <a:p>
-            <a:r>
-              <a:rPr lang="en-US" smtClean="0"/>
-              <a:t> Proportional Right Turn</a:t>
-            </a:r>
-            <a:endParaRPr lang="en-US" dirty="0"/>
-          </a:p>
-        </p:txBody>
-      </p:sp>
-    </p:spTree>
-    <p:extLst>
-      <p:ext uri="{BB962C8B-B14F-4D97-AF65-F5344CB8AC3E}">
-        <p14:creationId xmlns:p14="http://schemas.microsoft.com/office/powerpoint/2010/main" val="3367053584"/>
-      </p:ext>
-    </p:extLst>
-  </p:cSld>
-  <p:clrMapOvr>
-    <a:masterClrMapping/>
-  </p:clrMapOvr>
-  <p:timing>
-    <p:tnLst>
-      <p:par>
-        <p:cTn id="1" dur="indefinite" restart="never" nodeType="tmRoot"/>
-      </p:par>
-    </p:tnLst>
-  </p:timing>
-</p:sld>
-</file>
-
-<file path=ppt/slides/slide17.xml><?xml version="1.0" encoding="utf-8"?>
-<p:sld xmlns:a="http://schemas.openxmlformats.org/drawingml/2006/main" xmlns:r="http://schemas.openxmlformats.org/officeDocument/2006/relationships" xmlns:p="http://schemas.openxmlformats.org/presentationml/2006/main">
-  <p:cSld>
-    <p:spTree>
-      <p:nvGrpSpPr>
-        <p:cNvPr id="1" name=""/>
-        <p:cNvGrpSpPr/>
-        <p:nvPr/>
-      </p:nvGrpSpPr>
-      <p:grpSpPr>
-        <a:xfrm>
-          <a:off x="0" y="0"/>
-          <a:ext cx="0" cy="0"/>
-          <a:chOff x="0" y="0"/>
-          <a:chExt cx="0" cy="0"/>
-        </a:xfrm>
-      </p:grpSpPr>
-      <p:pic>
-        <p:nvPicPr>
-          <p:cNvPr id="8" name="Content Placeholder 7" descr="Screen Clipping"/>
-          <p:cNvPicPr>
-            <a:picLocks noGrp="1" noChangeAspect="1"/>
-          </p:cNvPicPr>
-          <p:nvPr>
-            <p:ph idx="1"/>
-          </p:nvPr>
-        </p:nvPicPr>
-        <p:blipFill>
-          <a:blip r:embed="rId2" cstate="email">
-            <a:extLst>
-              <a:ext uri="{28A0092B-C50C-407E-A947-70E740481C1C}">
-                <a14:useLocalDpi xmlns:a14="http://schemas.microsoft.com/office/drawing/2010/main" val="0"/>
-              </a:ext>
-            </a:extLst>
-          </a:blip>
-          <a:stretch>
-            <a:fillRect/>
-          </a:stretch>
-        </p:blipFill>
-        <p:spPr>
-          <a:xfrm>
-            <a:off x="284163" y="2028409"/>
-            <a:ext cx="8574087" cy="3888619"/>
-          </a:xfrm>
-        </p:spPr>
-      </p:pic>
-      <p:sp>
-        <p:nvSpPr>
-          <p:cNvPr id="4" name="Footer Placeholder 3"/>
-          <p:cNvSpPr>
-            <a:spLocks noGrp="1"/>
-          </p:cNvSpPr>
-          <p:nvPr>
-            <p:ph type="ftr" sz="quarter" idx="11"/>
-          </p:nvPr>
-        </p:nvSpPr>
-        <p:spPr/>
-        <p:txBody>
-          <a:bodyPr/>
-          <a:lstStyle/>
-          <a:p>
-            <a:r>
-              <a:rPr lang="en-US" smtClean="0"/>
-              <a:t>© 2015 EV3Lessons.com, Last edit 11/10/2015</a:t>
-            </a:r>
-            <a:endParaRPr lang="en-US" dirty="0"/>
-          </a:p>
-        </p:txBody>
-      </p:sp>
-      <p:sp>
-        <p:nvSpPr>
-          <p:cNvPr id="5" name="Slide Number Placeholder 4"/>
-          <p:cNvSpPr>
-            <a:spLocks noGrp="1"/>
-          </p:cNvSpPr>
-          <p:nvPr>
-            <p:ph type="sldNum" sz="quarter" idx="12"/>
-          </p:nvPr>
-        </p:nvSpPr>
-        <p:spPr/>
-        <p:txBody>
-          <a:bodyPr/>
-          <a:lstStyle/>
-          <a:p>
-            <a:fld id="{4382A7F7-08BF-4252-8141-63FB96055BBB}" type="slidenum">
-              <a:rPr lang="en-US" smtClean="0"/>
-              <a:pPr/>
-              <a:t>17</a:t>
-            </a:fld>
-            <a:endParaRPr lang="en-US" dirty="0"/>
-          </a:p>
-        </p:txBody>
-      </p:sp>
-      <p:sp>
-        <p:nvSpPr>
-          <p:cNvPr id="2" name="Title 1"/>
-          <p:cNvSpPr>
-            <a:spLocks noGrp="1"/>
-          </p:cNvSpPr>
-          <p:nvPr>
-            <p:ph type="title"/>
-          </p:nvPr>
-        </p:nvSpPr>
-        <p:spPr/>
-        <p:txBody>
-          <a:bodyPr/>
-          <a:lstStyle/>
-          <a:p>
-            <a:r>
-              <a:rPr lang="en-US" smtClean="0"/>
-              <a:t>Proportional Left Turn </a:t>
-            </a:r>
-            <a:endParaRPr lang="en-US" dirty="0"/>
-          </a:p>
-        </p:txBody>
-      </p:sp>
-      <p:sp>
-        <p:nvSpPr>
-          <p:cNvPr id="6" name="Content Placeholder 2"/>
-          <p:cNvSpPr txBox="1">
-            <a:spLocks/>
-          </p:cNvSpPr>
-          <p:nvPr/>
-        </p:nvSpPr>
-        <p:spPr>
-          <a:xfrm>
-            <a:off x="82935" y="4931388"/>
-            <a:ext cx="2600716" cy="1796021"/>
-          </a:xfrm>
-          <a:prstGeom prst="rect">
-            <a:avLst/>
-          </a:prstGeom>
-          <a:solidFill>
-            <a:srgbClr val="92D050"/>
-          </a:solidFill>
-        </p:spPr>
-        <p:txBody>
-          <a:bodyPr vert="horz" lIns="91440" tIns="45720" rIns="91440" bIns="45720" rtlCol="0">
-            <a:noAutofit/>
-          </a:bodyPr>
-          <a:lstStyle>
-            <a:lvl1pPr marL="454025" indent="-454025" algn="l" defTabSz="914400" rtl="0" eaLnBrk="1" latinLnBrk="0" hangingPunct="1">
-              <a:spcBef>
-                <a:spcPts val="2000"/>
-              </a:spcBef>
-              <a:buClr>
-                <a:schemeClr val="bg1">
-                  <a:lumMod val="65000"/>
-                </a:schemeClr>
-              </a:buClr>
-              <a:buSzPct val="90000"/>
-              <a:buFont typeface="Wingdings" pitchFamily="2" charset="2"/>
-              <a:buChar char=""/>
-              <a:defRPr sz="2400" kern="1200">
-                <a:solidFill>
-                  <a:schemeClr val="tx1">
-                    <a:lumMod val="85000"/>
-                    <a:lumOff val="15000"/>
-                  </a:schemeClr>
-                </a:solidFill>
-                <a:latin typeface="+mn-lt"/>
-                <a:ea typeface="+mn-ea"/>
-                <a:cs typeface="+mn-cs"/>
-              </a:defRPr>
-            </a:lvl1pPr>
-            <a:lvl2pPr marL="914400" indent="-457200" algn="l" defTabSz="914400" rtl="0" eaLnBrk="1" latinLnBrk="0" hangingPunct="1">
-              <a:spcBef>
-                <a:spcPts val="600"/>
-              </a:spcBef>
-              <a:buClr>
-                <a:schemeClr val="tx1">
-                  <a:lumMod val="75000"/>
-                  <a:lumOff val="25000"/>
-                </a:schemeClr>
-              </a:buClr>
-              <a:buSzPct val="90000"/>
-              <a:buFont typeface="Wingdings" pitchFamily="2" charset="2"/>
-              <a:buChar char=""/>
-              <a:defRPr sz="2200" kern="1200">
-                <a:solidFill>
-                  <a:schemeClr val="tx1">
-                    <a:lumMod val="85000"/>
-                    <a:lumOff val="15000"/>
-                  </a:schemeClr>
-                </a:solidFill>
-                <a:latin typeface="+mn-lt"/>
-                <a:ea typeface="+mn-ea"/>
-                <a:cs typeface="+mn-cs"/>
-              </a:defRPr>
-            </a:lvl2pPr>
-            <a:lvl3pPr marL="1260475" indent="-346075" algn="l" defTabSz="914400" rtl="0" eaLnBrk="1" latinLnBrk="0" hangingPunct="1">
-              <a:spcBef>
-                <a:spcPts val="600"/>
-              </a:spcBef>
-              <a:buClr>
-                <a:schemeClr val="bg1">
-                  <a:lumMod val="65000"/>
-                </a:schemeClr>
-              </a:buClr>
-              <a:buSzPct val="90000"/>
-              <a:buFont typeface="Wingdings" pitchFamily="2" charset="2"/>
-              <a:buChar char=""/>
-              <a:defRPr sz="2000" kern="1200">
-                <a:solidFill>
-                  <a:schemeClr val="tx1">
-                    <a:lumMod val="85000"/>
-                    <a:lumOff val="15000"/>
-                  </a:schemeClr>
-                </a:solidFill>
-                <a:latin typeface="+mn-lt"/>
-                <a:ea typeface="+mn-ea"/>
-                <a:cs typeface="+mn-cs"/>
-              </a:defRPr>
-            </a:lvl3pPr>
-            <a:lvl4pPr marL="1600200" indent="-339725" algn="l" defTabSz="914400" rtl="0" eaLnBrk="1" latinLnBrk="0" hangingPunct="1">
-              <a:spcBef>
-                <a:spcPts val="600"/>
-              </a:spcBef>
-              <a:buClr>
-                <a:schemeClr val="tx1">
-                  <a:lumMod val="75000"/>
-                  <a:lumOff val="25000"/>
-                </a:schemeClr>
-              </a:buClr>
-              <a:buSzPct val="90000"/>
-              <a:buFont typeface="Wingdings" pitchFamily="2" charset="2"/>
-              <a:buChar char=""/>
-              <a:defRPr sz="1800" kern="1200">
-                <a:solidFill>
-                  <a:schemeClr val="tx1">
-                    <a:lumMod val="85000"/>
-                    <a:lumOff val="15000"/>
-                  </a:schemeClr>
-                </a:solidFill>
-                <a:latin typeface="+mn-lt"/>
-                <a:ea typeface="+mn-ea"/>
-                <a:cs typeface="+mn-cs"/>
-              </a:defRPr>
-            </a:lvl4pPr>
-            <a:lvl5pPr marL="1939925" indent="-331788" algn="l" defTabSz="914400" rtl="0" eaLnBrk="1" latinLnBrk="0" hangingPunct="1">
-              <a:spcBef>
-                <a:spcPts val="600"/>
-              </a:spcBef>
-              <a:buClr>
-                <a:schemeClr val="bg1">
-                  <a:lumMod val="65000"/>
-                </a:schemeClr>
-              </a:buClr>
-              <a:buSzPct val="90000"/>
-              <a:buFont typeface="Wingdings" pitchFamily="2" charset="2"/>
-              <a:buChar char=""/>
-              <a:defRPr sz="1800" kern="1200">
-                <a:solidFill>
-                  <a:schemeClr val="tx1">
-                    <a:lumMod val="85000"/>
-                    <a:lumOff val="15000"/>
-                  </a:schemeClr>
-                </a:solidFill>
-                <a:latin typeface="+mn-lt"/>
-                <a:ea typeface="+mn-ea"/>
-                <a:cs typeface="+mn-cs"/>
-              </a:defRPr>
-            </a:lvl5pPr>
-            <a:lvl6pPr marL="2290763" indent="-344488" algn="l" defTabSz="914400" rtl="0" eaLnBrk="1" latinLnBrk="0" hangingPunct="1">
-              <a:spcBef>
-                <a:spcPts val="600"/>
-              </a:spcBef>
-              <a:buClr>
-                <a:schemeClr val="tx1">
-                  <a:lumMod val="75000"/>
-                  <a:lumOff val="25000"/>
-                </a:schemeClr>
-              </a:buClr>
-              <a:buSzPct val="90000"/>
-              <a:buFont typeface="Wingdings" pitchFamily="2" charset="2"/>
-              <a:buChar char=""/>
-              <a:defRPr lang="en-US" sz="1800" kern="1200" dirty="0" smtClean="0">
-                <a:solidFill>
-                  <a:schemeClr val="tx1">
-                    <a:lumMod val="85000"/>
-                    <a:lumOff val="15000"/>
-                  </a:schemeClr>
-                </a:solidFill>
-                <a:latin typeface="+mn-lt"/>
-                <a:ea typeface="+mn-ea"/>
-                <a:cs typeface="+mn-cs"/>
-              </a:defRPr>
-            </a:lvl6pPr>
-            <a:lvl7pPr marL="2625725" indent="-344488" algn="l" defTabSz="914400" rtl="0" eaLnBrk="1" latinLnBrk="0" hangingPunct="1">
-              <a:spcBef>
-                <a:spcPts val="600"/>
-              </a:spcBef>
-              <a:buClr>
-                <a:schemeClr val="bg1">
-                  <a:lumMod val="65000"/>
-                </a:schemeClr>
-              </a:buClr>
-              <a:buSzPct val="90000"/>
-              <a:buFont typeface="Wingdings" pitchFamily="2" charset="2"/>
-              <a:buChar char=""/>
-              <a:defRPr lang="en-US" sz="1800" kern="1200" dirty="0" smtClean="0">
-                <a:solidFill>
-                  <a:schemeClr val="tx1">
-                    <a:lumMod val="85000"/>
-                    <a:lumOff val="15000"/>
-                  </a:schemeClr>
-                </a:solidFill>
-                <a:latin typeface="+mn-lt"/>
-                <a:ea typeface="+mn-ea"/>
-                <a:cs typeface="+mn-cs"/>
-              </a:defRPr>
-            </a:lvl7pPr>
-            <a:lvl8pPr marL="2970213" indent="-344488" algn="l" defTabSz="914400" rtl="0" eaLnBrk="1" latinLnBrk="0" hangingPunct="1">
-              <a:spcBef>
-                <a:spcPts val="600"/>
-              </a:spcBef>
-              <a:buClr>
-                <a:schemeClr val="tx1">
-                  <a:lumMod val="75000"/>
-                  <a:lumOff val="25000"/>
-                </a:schemeClr>
-              </a:buClr>
-              <a:buSzPct val="90000"/>
-              <a:buFont typeface="Wingdings" pitchFamily="2" charset="2"/>
-              <a:buChar char=""/>
-              <a:defRPr lang="en-US" sz="1800" kern="1200" dirty="0" smtClean="0">
-                <a:solidFill>
-                  <a:schemeClr val="tx1">
-                    <a:lumMod val="85000"/>
-                    <a:lumOff val="15000"/>
-                  </a:schemeClr>
-                </a:solidFill>
-                <a:latin typeface="+mn-lt"/>
-                <a:ea typeface="+mn-ea"/>
-                <a:cs typeface="+mn-cs"/>
-              </a:defRPr>
-            </a:lvl8pPr>
-            <a:lvl9pPr marL="3313113" indent="-344488" algn="l" defTabSz="914400" rtl="0" eaLnBrk="1" latinLnBrk="0" hangingPunct="1">
-              <a:spcBef>
-                <a:spcPts val="600"/>
-              </a:spcBef>
-              <a:buClr>
-                <a:schemeClr val="bg1">
-                  <a:lumMod val="65000"/>
-                </a:schemeClr>
-              </a:buClr>
-              <a:buSzPct val="90000"/>
-              <a:buFont typeface="Wingdings" pitchFamily="2" charset="2"/>
-              <a:buChar char=""/>
-              <a:defRPr lang="en-US" sz="1800" kern="1200" dirty="0">
-                <a:solidFill>
-                  <a:schemeClr val="tx1">
-                    <a:lumMod val="85000"/>
-                    <a:lumOff val="15000"/>
-                  </a:schemeClr>
-                </a:solidFill>
-                <a:latin typeface="+mn-lt"/>
-                <a:ea typeface="+mn-ea"/>
-                <a:cs typeface="+mn-cs"/>
-              </a:defRPr>
-            </a:lvl9pPr>
-          </a:lstStyle>
-          <a:p>
-            <a:pPr marL="0" indent="0">
-              <a:buFont typeface="Wingdings" pitchFamily="2" charset="2"/>
-              <a:buNone/>
-            </a:pPr>
-            <a:r>
-              <a:rPr lang="en-US" sz="1100" dirty="0" smtClean="0">
-                <a:solidFill>
-                  <a:srgbClr val="FF0000"/>
-                </a:solidFill>
-              </a:rPr>
-              <a:t>What is going on with the math block in Left Pivot Turn?  You always calculate TARGET/GOAL MINUS CURRENT VALUE. So why an Addition Math Block?  </a:t>
-            </a:r>
-            <a:r>
-              <a:rPr lang="en-US" sz="1100" dirty="0">
-                <a:solidFill>
-                  <a:srgbClr val="FF0000"/>
-                </a:solidFill>
-              </a:rPr>
-              <a:t>W</a:t>
-            </a:r>
-            <a:r>
-              <a:rPr lang="en-US" sz="1100" dirty="0" smtClean="0">
-                <a:solidFill>
-                  <a:srgbClr val="FF0000"/>
-                </a:solidFill>
-              </a:rPr>
-              <a:t>hen you make a Left turn, the gyro always returns negative degrees.  From math, we know that adding a negative number is the same as subtracting the number.  So, that is why we use the Addition Math block in a  Left Gyro Turn.</a:t>
-            </a:r>
-          </a:p>
-          <a:p>
-            <a:pPr marL="0" indent="0">
-              <a:buFont typeface="Wingdings" pitchFamily="2" charset="2"/>
-              <a:buNone/>
-            </a:pPr>
-            <a:endParaRPr lang="en-US" sz="1100" dirty="0">
-              <a:solidFill>
-                <a:srgbClr val="FF0000"/>
-              </a:solidFill>
-            </a:endParaRPr>
-          </a:p>
-        </p:txBody>
-      </p:sp>
-    </p:spTree>
-    <p:extLst>
-      <p:ext uri="{BB962C8B-B14F-4D97-AF65-F5344CB8AC3E}">
-        <p14:creationId xmlns:p14="http://schemas.microsoft.com/office/powerpoint/2010/main" val="1646099312"/>
-      </p:ext>
-    </p:extLst>
-  </p:cSld>
-  <p:clrMapOvr>
-    <a:masterClrMapping/>
-  </p:clrMapOvr>
-  <p:timing>
-    <p:tnLst>
-      <p:par>
-        <p:cTn id="1" dur="indefinite" restart="never" nodeType="tmRoot"/>
-      </p:par>
-    </p:tnLst>
-  </p:timing>
-</p:sld>
-</file>
-
-<file path=ppt/slides/slide18.xml><?xml version="1.0" encoding="utf-8"?>
-<p:sld xmlns:a="http://schemas.openxmlformats.org/drawingml/2006/main" xmlns:r="http://schemas.openxmlformats.org/officeDocument/2006/relationships" xmlns:p="http://schemas.openxmlformats.org/presentationml/2006/main">
-  <p:cSld>
-    <p:spTree>
-      <p:nvGrpSpPr>
-        <p:cNvPr id="1" name=""/>
-        <p:cNvGrpSpPr/>
-        <p:nvPr/>
-      </p:nvGrpSpPr>
-      <p:grpSpPr>
-        <a:xfrm>
-          <a:off x="0" y="0"/>
-          <a:ext cx="0" cy="0"/>
-          <a:chOff x="0" y="0"/>
-          <a:chExt cx="0" cy="0"/>
-        </a:xfrm>
-      </p:grpSpPr>
-      <p:sp>
-        <p:nvSpPr>
-          <p:cNvPr id="3" name="Content Placeholder 2"/>
-          <p:cNvSpPr>
-            <a:spLocks noGrp="1"/>
-          </p:cNvSpPr>
-          <p:nvPr>
-            <p:ph idx="1"/>
-          </p:nvPr>
-        </p:nvSpPr>
-        <p:spPr/>
-        <p:txBody>
-          <a:bodyPr/>
-          <a:lstStyle/>
-          <a:p>
-            <a:pPr lvl="1"/>
-            <a:r>
-              <a:rPr lang="en-US" smtClean="0"/>
-              <a:t>What is gyro lag?</a:t>
-            </a:r>
-            <a:br>
-              <a:rPr lang="en-US" smtClean="0"/>
-            </a:br>
-            <a:r>
-              <a:rPr lang="en-US" smtClean="0"/>
-              <a:t>Ans. The gyro sensor’s reading lags behind the true reading</a:t>
-            </a:r>
-          </a:p>
-          <a:p>
-            <a:pPr lvl="1"/>
-            <a:r>
-              <a:rPr lang="en-US" smtClean="0"/>
-              <a:t>What is the difference between the two solutions presented in this lesson?</a:t>
-            </a:r>
-            <a:br>
-              <a:rPr lang="en-US" smtClean="0"/>
-            </a:br>
-            <a:r>
-              <a:rPr lang="en-US" smtClean="0"/>
-              <a:t>Ans. The first way was to reduce the amount of angle that you turn to compensate for lag. The second way was to use proportional control to continue performing your turn for a requested duration</a:t>
-            </a:r>
-            <a:endParaRPr lang="en-US" dirty="0"/>
-          </a:p>
-        </p:txBody>
-      </p:sp>
-      <p:sp>
-        <p:nvSpPr>
-          <p:cNvPr id="4" name="Footer Placeholder 3"/>
-          <p:cNvSpPr>
-            <a:spLocks noGrp="1"/>
-          </p:cNvSpPr>
-          <p:nvPr>
-            <p:ph type="ftr" sz="quarter" idx="11"/>
-          </p:nvPr>
-        </p:nvSpPr>
-        <p:spPr/>
-        <p:txBody>
-          <a:bodyPr/>
-          <a:lstStyle/>
-          <a:p>
-            <a:r>
-              <a:rPr lang="en-US" smtClean="0"/>
-              <a:t>© 2015 EV3Lessons.com, Last edit 11/10/2015</a:t>
-            </a:r>
-            <a:endParaRPr lang="en-US" dirty="0"/>
-          </a:p>
-        </p:txBody>
-      </p:sp>
-      <p:sp>
-        <p:nvSpPr>
-          <p:cNvPr id="7" name="Slide Number Placeholder 6"/>
-          <p:cNvSpPr>
-            <a:spLocks noGrp="1"/>
-          </p:cNvSpPr>
-          <p:nvPr>
-            <p:ph type="sldNum" sz="quarter" idx="12"/>
-          </p:nvPr>
-        </p:nvSpPr>
-        <p:spPr/>
-        <p:txBody>
-          <a:bodyPr/>
-          <a:lstStyle/>
-          <a:p>
-            <a:fld id="{4382A7F7-08BF-4252-8141-63FB96055BBB}" type="slidenum">
-              <a:rPr lang="en-US" smtClean="0"/>
-              <a:pPr/>
-              <a:t>18</a:t>
             </a:fld>
             <a:endParaRPr lang="en-US" dirty="0"/>
           </a:p>
@@ -7855,7 +6675,7 @@
 </p:sld>
 </file>
 
-<file path=ppt/slides/slide19.xml><?xml version="1.0" encoding="utf-8"?>
+<file path=ppt/slides/slide15.xml><?xml version="1.0" encoding="utf-8"?>
 <p:sld xmlns:a="http://schemas.openxmlformats.org/drawingml/2006/main" xmlns:r="http://schemas.openxmlformats.org/officeDocument/2006/relationships" xmlns:p="http://schemas.openxmlformats.org/presentationml/2006/main">
   <p:cSld>
     <p:spTree>
@@ -7949,8 +6769,8 @@
           <a:lstStyle/>
           <a:p>
             <a:r>
-              <a:rPr lang="en-US" smtClean="0"/>
-              <a:t>© 2015 EV3Lessons.com, Last edit 11/10/2015</a:t>
+              <a:rPr lang="sk-SK" smtClean="0"/>
+              <a:t>© 2015 EV3Lessons.com, Last edit 12/19/2015</a:t>
             </a:r>
             <a:endParaRPr lang="en-US" dirty="0"/>
           </a:p>
@@ -7974,7 +6794,7 @@
             <a:fld id="{4382A7F7-08BF-4252-8141-63FB96055BBB}" type="slidenum">
               <a:rPr lang="en-US" smtClean="0"/>
               <a:pPr/>
-              <a:t>19</a:t>
+              <a:t>15</a:t>
             </a:fld>
             <a:endParaRPr lang="en-US"/>
           </a:p>
@@ -8028,7 +6848,7 @@
           <a:effectLst/>
           <a:extLst>
             <a:ext uri="{91240B29-F687-4f45-9708-019B960494DF}">
-              <a14:hiddenLine xmlns:a14="http://schemas.microsoft.com/office/drawing/2010/main" xmlns="" w="9525">
+              <a14:hiddenLine xmlns="" xmlns:a14="http://schemas.microsoft.com/office/drawing/2010/main" w="9525">
                 <a:solidFill>
                   <a:schemeClr val="tx1"/>
                 </a:solidFill>
@@ -8038,7 +6858,7 @@
               </a14:hiddenLine>
             </a:ext>
             <a:ext uri="{AF507438-7753-43e0-B8FC-AC1667EBCBE1}">
-              <a14:hiddenEffects xmlns:a14="http://schemas.microsoft.com/office/drawing/2010/main" xmlns="">
+              <a14:hiddenEffects xmlns="" xmlns:a14="http://schemas.microsoft.com/office/drawing/2010/main">
                 <a:effectLst>
                   <a:outerShdw dist="35921" dir="2700000" algn="ctr" rotWithShape="0">
                     <a:schemeClr val="bg2"/>
@@ -8391,7 +7211,7 @@
           <a:noFill/>
           <a:extLst>
             <a:ext uri="{909E8E84-426E-40dd-AFC4-6F175D3DCCD1}">
-              <a14:hiddenFill xmlns:a14="http://schemas.microsoft.com/office/drawing/2010/main" xmlns="">
+              <a14:hiddenFill xmlns="" xmlns:a14="http://schemas.microsoft.com/office/drawing/2010/main">
                 <a:solidFill>
                   <a:srgbClr val="FFFFFF"/>
                 </a:solidFill>
@@ -8478,7 +7298,15 @@
             </a:pPr>
             <a:r>
               <a:rPr lang="en-US" dirty="0" smtClean="0"/>
-              <a:t>Learn two ways to correct for this lag</a:t>
+              <a:t>Learn </a:t>
+            </a:r>
+            <a:r>
+              <a:rPr lang="en-US" dirty="0" smtClean="0"/>
+              <a:t>one way </a:t>
+            </a:r>
+            <a:r>
+              <a:rPr lang="en-US" dirty="0" smtClean="0"/>
+              <a:t>to correct for this lag</a:t>
             </a:r>
           </a:p>
           <a:p>
@@ -8497,7 +7325,11 @@
           <a:p>
             <a:r>
               <a:rPr lang="en-US" dirty="0" smtClean="0"/>
-              <a:t>Pre-requisites: My Blocks with Inputs and Outputs, Data wires, Math Blocks, Loops, Proportional Control</a:t>
+              <a:t>Pre-requisites: My Blocks with Inputs and Outputs, Data wires, Math Blocks, </a:t>
+            </a:r>
+            <a:r>
+              <a:rPr lang="en-US" dirty="0" smtClean="0"/>
+              <a:t>Loops</a:t>
             </a:r>
             <a:endParaRPr lang="en-US" dirty="0"/>
           </a:p>
@@ -8519,8 +7351,8 @@
           <a:lstStyle/>
           <a:p>
             <a:r>
-              <a:rPr lang="en-US" dirty="0" smtClean="0"/>
-              <a:t>© 2015 EV3Lessons.com, Last edit 11/10/2015</a:t>
+              <a:rPr lang="sk-SK" smtClean="0"/>
+              <a:t>© 2015 EV3Lessons.com, Last edit 12/19/2015</a:t>
             </a:r>
             <a:endParaRPr lang="en-US" dirty="0"/>
           </a:p>
@@ -8646,39 +7478,41 @@
           <a:p>
             <a:r>
               <a:rPr lang="en-US" dirty="0" smtClean="0"/>
-              <a:t>This lesson presents two ways to deal with lag in a turn</a:t>
-            </a:r>
-          </a:p>
-          <a:p>
-            <a:pPr lvl="1">
-              <a:buFont typeface="+mj-lt"/>
-              <a:buAutoNum type="arabicPeriod"/>
-            </a:pPr>
+              <a:t>This lesson presents </a:t>
+            </a:r>
             <a:r>
               <a:rPr lang="en-US" dirty="0" smtClean="0"/>
-              <a:t>Reduce the amount of angle that you turn to compensate for lag (slides 4-</a:t>
+              <a:t>one way </a:t>
+            </a:r>
+            <a:r>
+              <a:rPr lang="en-US" dirty="0" smtClean="0"/>
+              <a:t>to deal with lag in a </a:t>
+            </a:r>
+            <a:r>
+              <a:rPr lang="en-US" dirty="0" smtClean="0"/>
+              <a:t>turn:</a:t>
             </a:r>
             <a:r>
               <a:rPr lang="en-US" dirty="0"/>
-              <a:t>9</a:t>
+              <a:t> </a:t>
+            </a:r>
+            <a:r>
+              <a:rPr lang="en-US" dirty="0"/>
+              <a:t>r</a:t>
             </a:r>
             <a:r>
               <a:rPr lang="en-US" dirty="0" smtClean="0"/>
-              <a:t>)</a:t>
-            </a:r>
-          </a:p>
-          <a:p>
-            <a:pPr lvl="1">
-              <a:buFont typeface="+mj-lt"/>
-              <a:buAutoNum type="arabicPeriod"/>
-            </a:pPr>
+              <a:t>educe </a:t>
+            </a:r>
             <a:r>
               <a:rPr lang="en-US" dirty="0" smtClean="0"/>
-              <a:t>Use proportional control to continue performing your turn for a requested duration (slides 10-12)</a:t>
-            </a:r>
-          </a:p>
-          <a:p>
-            <a:endParaRPr lang="en-US" dirty="0"/>
+              <a:t>the amount of angle that you turn to compensate for </a:t>
+            </a:r>
+            <a:r>
+              <a:rPr lang="en-US" dirty="0" smtClean="0"/>
+              <a:t>lag</a:t>
+            </a:r>
+            <a:endParaRPr lang="en-US" dirty="0" smtClean="0"/>
           </a:p>
         </p:txBody>
       </p:sp>
@@ -8698,8 +7532,8 @@
           <a:lstStyle/>
           <a:p>
             <a:r>
-              <a:rPr lang="en-US" dirty="0" smtClean="0"/>
-              <a:t>© 2015 EV3Lessons.com, Last edit 11/10/2015</a:t>
+              <a:rPr lang="sk-SK" smtClean="0"/>
+              <a:t>© 2015 EV3Lessons.com, Last edit 12/19/2015</a:t>
             </a:r>
             <a:endParaRPr lang="en-US" dirty="0"/>
           </a:p>
@@ -8836,8 +7670,8 @@
           <a:lstStyle/>
           <a:p>
             <a:r>
-              <a:rPr lang="en-US" smtClean="0"/>
-              <a:t>© 2015 EV3Lessons.com, Last edit 11/10/2015</a:t>
+              <a:rPr lang="sk-SK" smtClean="0"/>
+              <a:t>© 2015 EV3Lessons.com, Last edit 12/19/2015</a:t>
             </a:r>
             <a:endParaRPr lang="en-US"/>
           </a:p>
@@ -9241,8 +8075,8 @@
           <a:lstStyle/>
           <a:p>
             <a:r>
-              <a:rPr lang="en-US" dirty="0" smtClean="0"/>
-              <a:t>© 2015 EV3Lessons.com, Last edit 11/10/2015</a:t>
+              <a:rPr lang="sk-SK" smtClean="0"/>
+              <a:t>© 2015 EV3Lessons.com, Last edit 12/19/2015</a:t>
             </a:r>
             <a:endParaRPr lang="en-US" dirty="0"/>
           </a:p>
@@ -9453,8 +8287,8 @@
           <a:lstStyle/>
           <a:p>
             <a:r>
-              <a:rPr lang="en-US" smtClean="0"/>
-              <a:t>© 2015 EV3Lessons.com, Last edit 11/10/2015</a:t>
+              <a:rPr lang="sk-SK" smtClean="0"/>
+              <a:t>© 2015 EV3Lessons.com, Last edit 12/19/2015</a:t>
             </a:r>
             <a:endParaRPr lang="en-US" dirty="0"/>
           </a:p>
@@ -9620,8 +8454,8 @@
           <a:lstStyle/>
           <a:p>
             <a:r>
-              <a:rPr lang="en-US" smtClean="0"/>
-              <a:t>© 2015 EV3Lessons.com, Last edit 11/10/2015</a:t>
+              <a:rPr lang="sk-SK" smtClean="0"/>
+              <a:t>© 2015 EV3Lessons.com, Last edit 12/19/2015</a:t>
             </a:r>
             <a:endParaRPr lang="en-US" dirty="0"/>
           </a:p>
@@ -9756,8 +8590,8 @@
           <a:lstStyle/>
           <a:p>
             <a:r>
-              <a:rPr lang="en-US" smtClean="0"/>
-              <a:t>© 2015 EV3Lessons.com, Last edit 11/10/2015</a:t>
+              <a:rPr lang="sk-SK" smtClean="0"/>
+              <a:t>© 2015 EV3Lessons.com, Last edit 12/19/2015</a:t>
             </a:r>
             <a:endParaRPr lang="en-US"/>
           </a:p>
@@ -9864,8 +8698,8 @@
           <a:lstStyle/>
           <a:p>
             <a:r>
-              <a:rPr lang="en-US" dirty="0" smtClean="0"/>
-              <a:t>© 2015 EV3Lessons.com, Last edit 11/10/2015</a:t>
+              <a:rPr lang="sk-SK" smtClean="0"/>
+              <a:t>© 2015 EV3Lessons.com, Last edit 12/19/2015</a:t>
             </a:r>
             <a:endParaRPr lang="en-US" dirty="0"/>
           </a:p>

</xml_diff>